<commit_message>
fine tune dynamic programming
</commit_message>
<xml_diff>
--- a/Presentations/AI Dynamic Programming.pptx
+++ b/Presentations/AI Dynamic Programming.pptx
@@ -3094,11 +3094,7 @@
           <a:p>
             <a:r>
               <a:rPr lang="en-US" dirty="0" smtClean="0"/>
-              <a:t>Introduction to </a:t>
-            </a:r>
-            <a:r>
-              <a:rPr lang="en-US" dirty="0" smtClean="0"/>
-              <a:t>Dynamic Programming</a:t>
+              <a:t>Introduction to Dynamic Programming</a:t>
             </a:r>
             <a:r>
               <a:rPr lang="en-US" dirty="0"/>
@@ -4718,14 +4714,14 @@
           <p:nvPr>
             <p:extLst>
               <p:ext uri="{D42A27DB-BD31-4B8C-83A1-F6EECF244321}">
-                <p14:modId xmlns:p14="http://schemas.microsoft.com/office/powerpoint/2010/main" val="3353062977"/>
+                <p14:modId xmlns:p14="http://schemas.microsoft.com/office/powerpoint/2010/main" val="3212462636"/>
               </p:ext>
             </p:extLst>
           </p:nvPr>
         </p:nvGraphicFramePr>
         <p:xfrm>
           <a:off x="1974888" y="5501640"/>
-          <a:ext cx="3467100" cy="731520"/>
+          <a:ext cx="3467100" cy="1097280"/>
         </p:xfrm>
         <a:graphic>
           <a:graphicData uri="http://schemas.openxmlformats.org/drawingml/2006/table">
@@ -4797,6 +4793,40 @@
                   <a:tcPr/>
                 </a:tc>
               </a:tr>
+              <a:tr h="365760">
+                <a:tc>
+                  <a:txBody>
+                    <a:bodyPr/>
+                    <a:lstStyle/>
+                    <a:p>
+                      <a:r>
+                        <a:rPr lang="en-US" dirty="0" smtClean="0"/>
+                        <a:t>.23</a:t>
+                      </a:r>
+                      <a:endParaRPr lang="en-US" dirty="0"/>
+                    </a:p>
+                  </a:txBody>
+                  <a:tcPr/>
+                </a:tc>
+                <a:tc>
+                  <a:txBody>
+                    <a:bodyPr/>
+                    <a:lstStyle/>
+                    <a:p>
+                      <a:r>
+                        <a:rPr lang="en-US" dirty="0" smtClean="0"/>
+                        <a:t>[15,</a:t>
+                      </a:r>
+                      <a:r>
+                        <a:rPr lang="en-US" baseline="0" dirty="0" smtClean="0"/>
+                        <a:t> 4, 4]</a:t>
+                      </a:r>
+                      <a:endParaRPr lang="en-US" dirty="0"/>
+                    </a:p>
+                  </a:txBody>
+                  <a:tcPr/>
+                </a:tc>
+              </a:tr>
             </a:tbl>
           </a:graphicData>
         </a:graphic>
@@ -5259,6 +5289,42 @@
           </a:p>
         </p:txBody>
       </p:sp>
+      <p:cxnSp>
+        <p:nvCxnSpPr>
+          <p:cNvPr id="40" name="Straight Arrow Connector 39"/>
+          <p:cNvCxnSpPr/>
+          <p:nvPr/>
+        </p:nvCxnSpPr>
+        <p:spPr>
+          <a:xfrm flipH="1">
+            <a:off x="5478221" y="6419109"/>
+            <a:ext cx="1663634" cy="0"/>
+          </a:xfrm>
+          <a:prstGeom prst="straightConnector1">
+            <a:avLst/>
+          </a:prstGeom>
+          <a:ln w="25400">
+            <a:solidFill>
+              <a:schemeClr val="tx1"/>
+            </a:solidFill>
+            <a:tailEnd type="arrow"/>
+          </a:ln>
+        </p:spPr>
+        <p:style>
+          <a:lnRef idx="1">
+            <a:schemeClr val="accent1"/>
+          </a:lnRef>
+          <a:fillRef idx="0">
+            <a:schemeClr val="accent1"/>
+          </a:fillRef>
+          <a:effectRef idx="0">
+            <a:schemeClr val="accent1"/>
+          </a:effectRef>
+          <a:fontRef idx="minor">
+            <a:schemeClr val="tx1"/>
+          </a:fontRef>
+        </p:style>
+      </p:cxnSp>
     </p:spTree>
     <p:extLst>
       <p:ext uri="{BB962C8B-B14F-4D97-AF65-F5344CB8AC3E}">
@@ -5597,14 +5663,14 @@
               <a:t>Solve </a:t>
             </a:r>
             <a:r>
-              <a:rPr lang="en-US" sz="2800" b="1" dirty="0" err="1" smtClean="0">
+              <a:rPr lang="en-US" sz="2800" b="1" dirty="0" smtClean="0">
                 <a:solidFill>
                   <a:schemeClr val="tx2">
                     <a:lumMod val="75000"/>
                   </a:schemeClr>
                 </a:solidFill>
               </a:rPr>
-              <a:t>subproblems</a:t>
+              <a:t>sub-problems</a:t>
             </a:r>
             <a:r>
               <a:rPr lang="en-US" sz="2800" b="1" dirty="0" smtClean="0">

</xml_diff>

<commit_message>
add prune n-1 alternate solutions
</commit_message>
<xml_diff>
--- a/Presentations/AI Dynamic Programming.pptx
+++ b/Presentations/AI Dynamic Programming.pptx
@@ -21,7 +21,8 @@
     <p:sldId id="270" r:id="rId15"/>
     <p:sldId id="271" r:id="rId16"/>
     <p:sldId id="272" r:id="rId17"/>
-    <p:sldId id="268" r:id="rId18"/>
+    <p:sldId id="273" r:id="rId18"/>
+    <p:sldId id="268" r:id="rId19"/>
   </p:sldIdLst>
   <p:sldSz cx="9144000" cy="6858000" type="screen4x3"/>
   <p:notesSz cx="6858000" cy="9144000"/>
@@ -305,7 +306,7 @@
             <a:fld id="{1D8BD707-D9CF-40AE-B4C6-C98DA3205C09}" type="datetimeFigureOut">
               <a:rPr lang="en-US" smtClean="0"/>
               <a:pPr/>
-              <a:t>6/20/2017</a:t>
+              <a:t>6/29/2017</a:t>
             </a:fld>
             <a:endParaRPr lang="en-US"/>
           </a:p>
@@ -472,7 +473,7 @@
             <a:fld id="{1D8BD707-D9CF-40AE-B4C6-C98DA3205C09}" type="datetimeFigureOut">
               <a:rPr lang="en-US" smtClean="0"/>
               <a:pPr/>
-              <a:t>6/20/2017</a:t>
+              <a:t>6/29/2017</a:t>
             </a:fld>
             <a:endParaRPr lang="en-US"/>
           </a:p>
@@ -649,7 +650,7 @@
             <a:fld id="{1D8BD707-D9CF-40AE-B4C6-C98DA3205C09}" type="datetimeFigureOut">
               <a:rPr lang="en-US" smtClean="0"/>
               <a:pPr/>
-              <a:t>6/20/2017</a:t>
+              <a:t>6/29/2017</a:t>
             </a:fld>
             <a:endParaRPr lang="en-US"/>
           </a:p>
@@ -816,7 +817,7 @@
             <a:fld id="{1D8BD707-D9CF-40AE-B4C6-C98DA3205C09}" type="datetimeFigureOut">
               <a:rPr lang="en-US" smtClean="0"/>
               <a:pPr/>
-              <a:t>6/20/2017</a:t>
+              <a:t>6/29/2017</a:t>
             </a:fld>
             <a:endParaRPr lang="en-US"/>
           </a:p>
@@ -1059,7 +1060,7 @@
             <a:fld id="{1D8BD707-D9CF-40AE-B4C6-C98DA3205C09}" type="datetimeFigureOut">
               <a:rPr lang="en-US" smtClean="0"/>
               <a:pPr/>
-              <a:t>6/20/2017</a:t>
+              <a:t>6/29/2017</a:t>
             </a:fld>
             <a:endParaRPr lang="en-US"/>
           </a:p>
@@ -1344,7 +1345,7 @@
             <a:fld id="{1D8BD707-D9CF-40AE-B4C6-C98DA3205C09}" type="datetimeFigureOut">
               <a:rPr lang="en-US" smtClean="0"/>
               <a:pPr/>
-              <a:t>6/20/2017</a:t>
+              <a:t>6/29/2017</a:t>
             </a:fld>
             <a:endParaRPr lang="en-US"/>
           </a:p>
@@ -1763,7 +1764,7 @@
             <a:fld id="{1D8BD707-D9CF-40AE-B4C6-C98DA3205C09}" type="datetimeFigureOut">
               <a:rPr lang="en-US" smtClean="0"/>
               <a:pPr/>
-              <a:t>6/20/2017</a:t>
+              <a:t>6/29/2017</a:t>
             </a:fld>
             <a:endParaRPr lang="en-US"/>
           </a:p>
@@ -1878,7 +1879,7 @@
             <a:fld id="{1D8BD707-D9CF-40AE-B4C6-C98DA3205C09}" type="datetimeFigureOut">
               <a:rPr lang="en-US" smtClean="0"/>
               <a:pPr/>
-              <a:t>6/20/2017</a:t>
+              <a:t>6/29/2017</a:t>
             </a:fld>
             <a:endParaRPr lang="en-US"/>
           </a:p>
@@ -1970,7 +1971,7 @@
             <a:fld id="{1D8BD707-D9CF-40AE-B4C6-C98DA3205C09}" type="datetimeFigureOut">
               <a:rPr lang="en-US" smtClean="0"/>
               <a:pPr/>
-              <a:t>6/20/2017</a:t>
+              <a:t>6/29/2017</a:t>
             </a:fld>
             <a:endParaRPr lang="en-US"/>
           </a:p>
@@ -2244,7 +2245,7 @@
             <a:fld id="{1D8BD707-D9CF-40AE-B4C6-C98DA3205C09}" type="datetimeFigureOut">
               <a:rPr lang="en-US" smtClean="0"/>
               <a:pPr/>
-              <a:t>6/20/2017</a:t>
+              <a:t>6/29/2017</a:t>
             </a:fld>
             <a:endParaRPr lang="en-US"/>
           </a:p>
@@ -2494,7 +2495,7 @@
             <a:fld id="{1D8BD707-D9CF-40AE-B4C6-C98DA3205C09}" type="datetimeFigureOut">
               <a:rPr lang="en-US" smtClean="0"/>
               <a:pPr/>
-              <a:t>6/20/2017</a:t>
+              <a:t>6/29/2017</a:t>
             </a:fld>
             <a:endParaRPr lang="en-US"/>
           </a:p>
@@ -2704,7 +2705,7 @@
             <a:fld id="{1D8BD707-D9CF-40AE-B4C6-C98DA3205C09}" type="datetimeFigureOut">
               <a:rPr lang="en-US" smtClean="0"/>
               <a:pPr/>
-              <a:t>6/20/2017</a:t>
+              <a:t>6/29/2017</a:t>
             </a:fld>
             <a:endParaRPr lang="en-US"/>
           </a:p>
@@ -10575,6 +10576,1526 @@
                   </a:schemeClr>
                 </a:solidFill>
               </a:rPr>
+              <a:t>Advanced </a:t>
+            </a:r>
+            <a:r>
+              <a:rPr lang="en-US" sz="4000" dirty="0" smtClean="0">
+                <a:solidFill>
+                  <a:schemeClr val="accent1">
+                    <a:lumMod val="75000"/>
+                  </a:schemeClr>
+                </a:solidFill>
+              </a:rPr>
+              <a:t>– </a:t>
+            </a:r>
+            <a:r>
+              <a:rPr lang="en-US" sz="4000" smtClean="0">
+                <a:solidFill>
+                  <a:schemeClr val="accent1">
+                    <a:lumMod val="75000"/>
+                  </a:schemeClr>
+                </a:solidFill>
+              </a:rPr>
+              <a:t>Prune N-1 </a:t>
+            </a:r>
+            <a:r>
+              <a:rPr lang="en-US" sz="4000" dirty="0" smtClean="0">
+                <a:solidFill>
+                  <a:schemeClr val="accent1">
+                    <a:lumMod val="75000"/>
+                  </a:schemeClr>
+                </a:solidFill>
+              </a:rPr>
+              <a:t>candidate solutions</a:t>
+            </a:r>
+            <a:endParaRPr lang="en-US" sz="4000" dirty="0">
+              <a:solidFill>
+                <a:schemeClr val="accent1">
+                  <a:lumMod val="75000"/>
+                </a:schemeClr>
+              </a:solidFill>
+            </a:endParaRPr>
+          </a:p>
+        </p:txBody>
+      </p:sp>
+      <p:cxnSp>
+        <p:nvCxnSpPr>
+          <p:cNvPr id="5" name="Straight Connector 4"/>
+          <p:cNvCxnSpPr/>
+          <p:nvPr/>
+        </p:nvCxnSpPr>
+        <p:spPr>
+          <a:xfrm>
+            <a:off x="0" y="990600"/>
+            <a:ext cx="9144000" cy="0"/>
+          </a:xfrm>
+          <a:prstGeom prst="line">
+            <a:avLst/>
+          </a:prstGeom>
+          <a:ln w="19050"/>
+        </p:spPr>
+        <p:style>
+          <a:lnRef idx="1">
+            <a:schemeClr val="accent1"/>
+          </a:lnRef>
+          <a:fillRef idx="0">
+            <a:schemeClr val="accent1"/>
+          </a:fillRef>
+          <a:effectRef idx="0">
+            <a:schemeClr val="accent1"/>
+          </a:effectRef>
+          <a:fontRef idx="minor">
+            <a:schemeClr val="tx1"/>
+          </a:fontRef>
+        </p:style>
+      </p:cxnSp>
+      <p:sp>
+        <p:nvSpPr>
+          <p:cNvPr id="13" name="Dodecagon 12"/>
+          <p:cNvSpPr/>
+          <p:nvPr/>
+        </p:nvSpPr>
+        <p:spPr>
+          <a:xfrm>
+            <a:off x="1236782" y="2869745"/>
+            <a:ext cx="838200" cy="762000"/>
+          </a:xfrm>
+          <a:prstGeom prst="dodecagon">
+            <a:avLst/>
+          </a:prstGeom>
+        </p:spPr>
+        <p:style>
+          <a:lnRef idx="2">
+            <a:schemeClr val="accent1">
+              <a:shade val="50000"/>
+            </a:schemeClr>
+          </a:lnRef>
+          <a:fillRef idx="1">
+            <a:schemeClr val="accent1"/>
+          </a:fillRef>
+          <a:effectRef idx="0">
+            <a:schemeClr val="accent1"/>
+          </a:effectRef>
+          <a:fontRef idx="minor">
+            <a:schemeClr val="lt1"/>
+          </a:fontRef>
+        </p:style>
+        <p:txBody>
+          <a:bodyPr rtlCol="0" anchor="ctr"/>
+          <a:lstStyle/>
+          <a:p>
+            <a:pPr algn="ctr"/>
+            <a:r>
+              <a:rPr lang="en-US" dirty="0" smtClean="0"/>
+              <a:t>1</a:t>
+            </a:r>
+            <a:endParaRPr lang="en-US" dirty="0"/>
+          </a:p>
+        </p:txBody>
+      </p:sp>
+      <p:sp>
+        <p:nvSpPr>
+          <p:cNvPr id="14" name="Dodecagon 13"/>
+          <p:cNvSpPr/>
+          <p:nvPr/>
+        </p:nvSpPr>
+        <p:spPr>
+          <a:xfrm>
+            <a:off x="3228685" y="2869745"/>
+            <a:ext cx="838200" cy="762000"/>
+          </a:xfrm>
+          <a:prstGeom prst="dodecagon">
+            <a:avLst/>
+          </a:prstGeom>
+        </p:spPr>
+        <p:style>
+          <a:lnRef idx="2">
+            <a:schemeClr val="accent1">
+              <a:shade val="50000"/>
+            </a:schemeClr>
+          </a:lnRef>
+          <a:fillRef idx="1">
+            <a:schemeClr val="accent1"/>
+          </a:fillRef>
+          <a:effectRef idx="0">
+            <a:schemeClr val="accent1"/>
+          </a:effectRef>
+          <a:fontRef idx="minor">
+            <a:schemeClr val="lt1"/>
+          </a:fontRef>
+        </p:style>
+        <p:txBody>
+          <a:bodyPr rtlCol="0" anchor="ctr"/>
+          <a:lstStyle/>
+          <a:p>
+            <a:pPr algn="ctr"/>
+            <a:r>
+              <a:rPr lang="en-US" dirty="0" smtClean="0"/>
+              <a:t>4</a:t>
+            </a:r>
+            <a:endParaRPr lang="en-US" dirty="0"/>
+          </a:p>
+        </p:txBody>
+      </p:sp>
+      <p:sp>
+        <p:nvSpPr>
+          <p:cNvPr id="15" name="Dodecagon 14"/>
+          <p:cNvSpPr/>
+          <p:nvPr/>
+        </p:nvSpPr>
+        <p:spPr>
+          <a:xfrm>
+            <a:off x="4792782" y="2854844"/>
+            <a:ext cx="838200" cy="762000"/>
+          </a:xfrm>
+          <a:prstGeom prst="dodecagon">
+            <a:avLst/>
+          </a:prstGeom>
+        </p:spPr>
+        <p:style>
+          <a:lnRef idx="2">
+            <a:schemeClr val="accent1">
+              <a:shade val="50000"/>
+            </a:schemeClr>
+          </a:lnRef>
+          <a:fillRef idx="1">
+            <a:schemeClr val="accent1"/>
+          </a:fillRef>
+          <a:effectRef idx="0">
+            <a:schemeClr val="accent1"/>
+          </a:effectRef>
+          <a:fontRef idx="minor">
+            <a:schemeClr val="lt1"/>
+          </a:fontRef>
+        </p:style>
+        <p:txBody>
+          <a:bodyPr rtlCol="0" anchor="ctr"/>
+          <a:lstStyle/>
+          <a:p>
+            <a:pPr algn="ctr"/>
+            <a:r>
+              <a:rPr lang="en-US" dirty="0" smtClean="0"/>
+              <a:t>5</a:t>
+            </a:r>
+            <a:endParaRPr lang="en-US" dirty="0"/>
+          </a:p>
+        </p:txBody>
+      </p:sp>
+      <p:sp>
+        <p:nvSpPr>
+          <p:cNvPr id="22" name="Dodecagon 21"/>
+          <p:cNvSpPr/>
+          <p:nvPr/>
+        </p:nvSpPr>
+        <p:spPr>
+          <a:xfrm>
+            <a:off x="3954582" y="1518380"/>
+            <a:ext cx="838200" cy="762000"/>
+          </a:xfrm>
+          <a:prstGeom prst="dodecagon">
+            <a:avLst/>
+          </a:prstGeom>
+        </p:spPr>
+        <p:style>
+          <a:lnRef idx="2">
+            <a:schemeClr val="accent1">
+              <a:shade val="50000"/>
+            </a:schemeClr>
+          </a:lnRef>
+          <a:fillRef idx="1">
+            <a:schemeClr val="accent1"/>
+          </a:fillRef>
+          <a:effectRef idx="0">
+            <a:schemeClr val="accent1"/>
+          </a:effectRef>
+          <a:fontRef idx="minor">
+            <a:schemeClr val="lt1"/>
+          </a:fontRef>
+        </p:style>
+        <p:txBody>
+          <a:bodyPr rtlCol="0" anchor="ctr"/>
+          <a:lstStyle/>
+          <a:p>
+            <a:pPr algn="ctr"/>
+            <a:endParaRPr lang="en-US" dirty="0"/>
+          </a:p>
+        </p:txBody>
+      </p:sp>
+      <p:cxnSp>
+        <p:nvCxnSpPr>
+          <p:cNvPr id="9" name="Straight Arrow Connector 8"/>
+          <p:cNvCxnSpPr>
+            <a:stCxn id="22" idx="6"/>
+          </p:cNvCxnSpPr>
+          <p:nvPr/>
+        </p:nvCxnSpPr>
+        <p:spPr>
+          <a:xfrm flipH="1">
+            <a:off x="1981200" y="2178286"/>
+            <a:ext cx="2085685" cy="793514"/>
+          </a:xfrm>
+          <a:prstGeom prst="straightConnector1">
+            <a:avLst/>
+          </a:prstGeom>
+          <a:ln w="25400">
+            <a:solidFill>
+              <a:schemeClr val="tx1"/>
+            </a:solidFill>
+            <a:tailEnd type="arrow"/>
+          </a:ln>
+        </p:spPr>
+        <p:style>
+          <a:lnRef idx="1">
+            <a:schemeClr val="accent1"/>
+          </a:lnRef>
+          <a:fillRef idx="0">
+            <a:schemeClr val="accent1"/>
+          </a:fillRef>
+          <a:effectRef idx="0">
+            <a:schemeClr val="accent1"/>
+          </a:effectRef>
+          <a:fontRef idx="minor">
+            <a:schemeClr val="tx1"/>
+          </a:fontRef>
+        </p:style>
+      </p:cxnSp>
+      <p:cxnSp>
+        <p:nvCxnSpPr>
+          <p:cNvPr id="25" name="Straight Arrow Connector 24"/>
+          <p:cNvCxnSpPr>
+            <a:stCxn id="22" idx="5"/>
+          </p:cNvCxnSpPr>
+          <p:nvPr/>
+        </p:nvCxnSpPr>
+        <p:spPr>
+          <a:xfrm flipH="1">
+            <a:off x="3862825" y="2280380"/>
+            <a:ext cx="398554" cy="589365"/>
+          </a:xfrm>
+          <a:prstGeom prst="straightConnector1">
+            <a:avLst/>
+          </a:prstGeom>
+          <a:ln w="25400">
+            <a:solidFill>
+              <a:schemeClr val="tx1"/>
+            </a:solidFill>
+            <a:tailEnd type="arrow"/>
+          </a:ln>
+        </p:spPr>
+        <p:style>
+          <a:lnRef idx="1">
+            <a:schemeClr val="accent1"/>
+          </a:lnRef>
+          <a:fillRef idx="0">
+            <a:schemeClr val="accent1"/>
+          </a:fillRef>
+          <a:effectRef idx="0">
+            <a:schemeClr val="accent1"/>
+          </a:effectRef>
+          <a:fontRef idx="minor">
+            <a:schemeClr val="tx1"/>
+          </a:fontRef>
+        </p:style>
+      </p:cxnSp>
+      <p:cxnSp>
+        <p:nvCxnSpPr>
+          <p:cNvPr id="30" name="Straight Arrow Connector 29"/>
+          <p:cNvCxnSpPr>
+            <a:stCxn id="22" idx="4"/>
+          </p:cNvCxnSpPr>
+          <p:nvPr/>
+        </p:nvCxnSpPr>
+        <p:spPr>
+          <a:xfrm>
+            <a:off x="4485985" y="2280380"/>
+            <a:ext cx="467015" cy="691420"/>
+          </a:xfrm>
+          <a:prstGeom prst="straightConnector1">
+            <a:avLst/>
+          </a:prstGeom>
+          <a:ln w="25400">
+            <a:solidFill>
+              <a:schemeClr val="tx1"/>
+            </a:solidFill>
+            <a:tailEnd type="arrow"/>
+          </a:ln>
+        </p:spPr>
+        <p:style>
+          <a:lnRef idx="1">
+            <a:schemeClr val="accent1"/>
+          </a:lnRef>
+          <a:fillRef idx="0">
+            <a:schemeClr val="accent1"/>
+          </a:fillRef>
+          <a:effectRef idx="0">
+            <a:schemeClr val="accent1"/>
+          </a:effectRef>
+          <a:fontRef idx="minor">
+            <a:schemeClr val="tx1"/>
+          </a:fontRef>
+        </p:style>
+      </p:cxnSp>
+      <p:sp>
+        <p:nvSpPr>
+          <p:cNvPr id="37" name="Rectangle 36"/>
+          <p:cNvSpPr/>
+          <p:nvPr/>
+        </p:nvSpPr>
+        <p:spPr>
+          <a:xfrm>
+            <a:off x="2838363" y="1128527"/>
+            <a:ext cx="3242234" cy="369332"/>
+          </a:xfrm>
+          <a:prstGeom prst="rect">
+            <a:avLst/>
+          </a:prstGeom>
+        </p:spPr>
+        <p:txBody>
+          <a:bodyPr wrap="none">
+            <a:spAutoFit/>
+          </a:bodyPr>
+          <a:lstStyle/>
+          <a:p>
+            <a:r>
+              <a:rPr lang="en-US" b="1" dirty="0" smtClean="0">
+                <a:solidFill>
+                  <a:schemeClr val="accent3">
+                    <a:lumMod val="50000"/>
+                  </a:schemeClr>
+                </a:solidFill>
+              </a:rPr>
+              <a:t>coins = BFS( $.23, [ 15, 5, 4, 1 ] ) </a:t>
+            </a:r>
+            <a:endParaRPr lang="en-US" dirty="0"/>
+          </a:p>
+        </p:txBody>
+      </p:sp>
+      <p:sp>
+        <p:nvSpPr>
+          <p:cNvPr id="44" name="Dodecagon 43"/>
+          <p:cNvSpPr/>
+          <p:nvPr/>
+        </p:nvSpPr>
+        <p:spPr>
+          <a:xfrm>
+            <a:off x="6756400" y="2867544"/>
+            <a:ext cx="838200" cy="762000"/>
+          </a:xfrm>
+          <a:prstGeom prst="dodecagon">
+            <a:avLst/>
+          </a:prstGeom>
+        </p:spPr>
+        <p:style>
+          <a:lnRef idx="2">
+            <a:schemeClr val="accent1">
+              <a:shade val="50000"/>
+            </a:schemeClr>
+          </a:lnRef>
+          <a:fillRef idx="1">
+            <a:schemeClr val="accent1"/>
+          </a:fillRef>
+          <a:effectRef idx="0">
+            <a:schemeClr val="accent1"/>
+          </a:effectRef>
+          <a:fontRef idx="minor">
+            <a:schemeClr val="lt1"/>
+          </a:fontRef>
+        </p:style>
+        <p:txBody>
+          <a:bodyPr rtlCol="0" anchor="ctr"/>
+          <a:lstStyle/>
+          <a:p>
+            <a:pPr algn="ctr"/>
+            <a:r>
+              <a:rPr lang="en-US" dirty="0" smtClean="0"/>
+              <a:t>15</a:t>
+            </a:r>
+            <a:endParaRPr lang="en-US" dirty="0"/>
+          </a:p>
+        </p:txBody>
+      </p:sp>
+      <p:cxnSp>
+        <p:nvCxnSpPr>
+          <p:cNvPr id="54" name="Straight Arrow Connector 53"/>
+          <p:cNvCxnSpPr>
+            <a:stCxn id="22" idx="3"/>
+            <a:endCxn id="44" idx="8"/>
+          </p:cNvCxnSpPr>
+          <p:nvPr/>
+        </p:nvCxnSpPr>
+        <p:spPr>
+          <a:xfrm>
+            <a:off x="4680479" y="2178286"/>
+            <a:ext cx="2075921" cy="968164"/>
+          </a:xfrm>
+          <a:prstGeom prst="straightConnector1">
+            <a:avLst/>
+          </a:prstGeom>
+          <a:ln w="25400">
+            <a:solidFill>
+              <a:schemeClr val="tx1"/>
+            </a:solidFill>
+            <a:tailEnd type="arrow"/>
+          </a:ln>
+        </p:spPr>
+        <p:style>
+          <a:lnRef idx="1">
+            <a:schemeClr val="accent1"/>
+          </a:lnRef>
+          <a:fillRef idx="0">
+            <a:schemeClr val="accent1"/>
+          </a:fillRef>
+          <a:effectRef idx="0">
+            <a:schemeClr val="accent1"/>
+          </a:effectRef>
+          <a:fontRef idx="minor">
+            <a:schemeClr val="tx1"/>
+          </a:fontRef>
+        </p:style>
+      </p:cxnSp>
+      <p:sp>
+        <p:nvSpPr>
+          <p:cNvPr id="19" name="TextBox 18"/>
+          <p:cNvSpPr txBox="1"/>
+          <p:nvPr/>
+        </p:nvSpPr>
+        <p:spPr>
+          <a:xfrm>
+            <a:off x="6932335" y="1790589"/>
+            <a:ext cx="1324530" cy="338554"/>
+          </a:xfrm>
+          <a:prstGeom prst="rect">
+            <a:avLst/>
+          </a:prstGeom>
+          <a:noFill/>
+        </p:spPr>
+        <p:txBody>
+          <a:bodyPr wrap="none" rtlCol="0">
+            <a:spAutoFit/>
+          </a:bodyPr>
+          <a:lstStyle/>
+          <a:p>
+            <a:r>
+              <a:rPr lang="en-US" sz="1600" dirty="0" smtClean="0"/>
+              <a:t>Solve for $.08</a:t>
+            </a:r>
+            <a:endParaRPr lang="en-US" sz="1600" dirty="0"/>
+          </a:p>
+        </p:txBody>
+      </p:sp>
+      <p:cxnSp>
+        <p:nvCxnSpPr>
+          <p:cNvPr id="20" name="Curved Connector 19"/>
+          <p:cNvCxnSpPr>
+            <a:endCxn id="39" idx="2"/>
+          </p:cNvCxnSpPr>
+          <p:nvPr/>
+        </p:nvCxnSpPr>
+        <p:spPr>
+          <a:xfrm rot="10800000" flipV="1">
+            <a:off x="4481203" y="4255837"/>
+            <a:ext cx="457759" cy="297388"/>
+          </a:xfrm>
+          <a:prstGeom prst="curvedConnector3">
+            <a:avLst/>
+          </a:prstGeom>
+          <a:ln w="12700">
+            <a:solidFill>
+              <a:schemeClr val="tx1"/>
+            </a:solidFill>
+            <a:tailEnd type="arrow"/>
+          </a:ln>
+        </p:spPr>
+        <p:style>
+          <a:lnRef idx="1">
+            <a:schemeClr val="accent1"/>
+          </a:lnRef>
+          <a:fillRef idx="0">
+            <a:schemeClr val="accent1"/>
+          </a:fillRef>
+          <a:effectRef idx="0">
+            <a:schemeClr val="accent1"/>
+          </a:effectRef>
+          <a:fontRef idx="minor">
+            <a:schemeClr val="tx1"/>
+          </a:fontRef>
+        </p:style>
+      </p:cxnSp>
+      <p:cxnSp>
+        <p:nvCxnSpPr>
+          <p:cNvPr id="23" name="Curved Connector 22"/>
+          <p:cNvCxnSpPr>
+            <a:endCxn id="44" idx="10"/>
+          </p:cNvCxnSpPr>
+          <p:nvPr/>
+        </p:nvCxnSpPr>
+        <p:spPr>
+          <a:xfrm rot="5400000">
+            <a:off x="6820628" y="2277553"/>
+            <a:ext cx="832561" cy="347421"/>
+          </a:xfrm>
+          <a:prstGeom prst="curvedConnector3">
+            <a:avLst/>
+          </a:prstGeom>
+          <a:ln w="12700">
+            <a:solidFill>
+              <a:schemeClr val="tx1"/>
+            </a:solidFill>
+            <a:tailEnd type="arrow"/>
+          </a:ln>
+        </p:spPr>
+        <p:style>
+          <a:lnRef idx="1">
+            <a:schemeClr val="accent1"/>
+          </a:lnRef>
+          <a:fillRef idx="0">
+            <a:schemeClr val="accent1"/>
+          </a:fillRef>
+          <a:effectRef idx="0">
+            <a:schemeClr val="accent1"/>
+          </a:effectRef>
+          <a:fontRef idx="minor">
+            <a:schemeClr val="tx1"/>
+          </a:fontRef>
+        </p:style>
+      </p:cxnSp>
+      <p:sp>
+        <p:nvSpPr>
+          <p:cNvPr id="26" name="TextBox 25"/>
+          <p:cNvSpPr txBox="1"/>
+          <p:nvPr/>
+        </p:nvSpPr>
+        <p:spPr>
+          <a:xfrm>
+            <a:off x="4912666" y="4038600"/>
+            <a:ext cx="1324530" cy="338554"/>
+          </a:xfrm>
+          <a:prstGeom prst="rect">
+            <a:avLst/>
+          </a:prstGeom>
+          <a:noFill/>
+        </p:spPr>
+        <p:txBody>
+          <a:bodyPr wrap="none" rtlCol="0">
+            <a:spAutoFit/>
+          </a:bodyPr>
+          <a:lstStyle/>
+          <a:p>
+            <a:r>
+              <a:rPr lang="en-US" sz="1600" dirty="0" smtClean="0"/>
+              <a:t>Solve for </a:t>
+            </a:r>
+            <a:r>
+              <a:rPr lang="en-US" sz="1600" dirty="0" smtClean="0"/>
+              <a:t>$.15</a:t>
+            </a:r>
+            <a:endParaRPr lang="en-US" sz="1600" dirty="0"/>
+          </a:p>
+        </p:txBody>
+      </p:sp>
+      <p:cxnSp>
+        <p:nvCxnSpPr>
+          <p:cNvPr id="28" name="Curved Connector 27"/>
+          <p:cNvCxnSpPr/>
+          <p:nvPr/>
+        </p:nvCxnSpPr>
+        <p:spPr>
+          <a:xfrm>
+            <a:off x="1635538" y="4234546"/>
+            <a:ext cx="969404" cy="490699"/>
+          </a:xfrm>
+          <a:prstGeom prst="curvedConnector3">
+            <a:avLst>
+              <a:gd name="adj1" fmla="val 50000"/>
+            </a:avLst>
+          </a:prstGeom>
+          <a:ln w="12700">
+            <a:solidFill>
+              <a:schemeClr val="tx1"/>
+            </a:solidFill>
+            <a:tailEnd type="arrow"/>
+          </a:ln>
+        </p:spPr>
+        <p:style>
+          <a:lnRef idx="1">
+            <a:schemeClr val="accent1"/>
+          </a:lnRef>
+          <a:fillRef idx="0">
+            <a:schemeClr val="accent1"/>
+          </a:fillRef>
+          <a:effectRef idx="0">
+            <a:schemeClr val="accent1"/>
+          </a:effectRef>
+          <a:fontRef idx="minor">
+            <a:schemeClr val="tx1"/>
+          </a:fontRef>
+        </p:style>
+      </p:cxnSp>
+      <p:sp>
+        <p:nvSpPr>
+          <p:cNvPr id="32" name="Dodecagon 31"/>
+          <p:cNvSpPr/>
+          <p:nvPr/>
+        </p:nvSpPr>
+        <p:spPr>
+          <a:xfrm>
+            <a:off x="6743700" y="4038600"/>
+            <a:ext cx="838200" cy="762000"/>
+          </a:xfrm>
+          <a:prstGeom prst="dodecagon">
+            <a:avLst/>
+          </a:prstGeom>
+        </p:spPr>
+        <p:style>
+          <a:lnRef idx="2">
+            <a:schemeClr val="accent1">
+              <a:shade val="50000"/>
+            </a:schemeClr>
+          </a:lnRef>
+          <a:fillRef idx="1">
+            <a:schemeClr val="accent1"/>
+          </a:fillRef>
+          <a:effectRef idx="0">
+            <a:schemeClr val="accent1"/>
+          </a:effectRef>
+          <a:fontRef idx="minor">
+            <a:schemeClr val="lt1"/>
+          </a:fontRef>
+        </p:style>
+        <p:txBody>
+          <a:bodyPr rtlCol="0" anchor="ctr"/>
+          <a:lstStyle/>
+          <a:p>
+            <a:pPr algn="ctr"/>
+            <a:r>
+              <a:rPr lang="en-US" dirty="0" smtClean="0"/>
+              <a:t>4</a:t>
+            </a:r>
+            <a:endParaRPr lang="en-US" dirty="0"/>
+          </a:p>
+        </p:txBody>
+      </p:sp>
+      <p:sp>
+        <p:nvSpPr>
+          <p:cNvPr id="33" name="Dodecagon 32"/>
+          <p:cNvSpPr/>
+          <p:nvPr/>
+        </p:nvSpPr>
+        <p:spPr>
+          <a:xfrm>
+            <a:off x="6743700" y="5105400"/>
+            <a:ext cx="838200" cy="762000"/>
+          </a:xfrm>
+          <a:prstGeom prst="dodecagon">
+            <a:avLst/>
+          </a:prstGeom>
+          <a:solidFill>
+            <a:srgbClr val="FFC000"/>
+          </a:solidFill>
+        </p:spPr>
+        <p:style>
+          <a:lnRef idx="2">
+            <a:schemeClr val="accent1">
+              <a:shade val="50000"/>
+            </a:schemeClr>
+          </a:lnRef>
+          <a:fillRef idx="1">
+            <a:schemeClr val="accent1"/>
+          </a:fillRef>
+          <a:effectRef idx="0">
+            <a:schemeClr val="accent1"/>
+          </a:effectRef>
+          <a:fontRef idx="minor">
+            <a:schemeClr val="lt1"/>
+          </a:fontRef>
+        </p:style>
+        <p:txBody>
+          <a:bodyPr rtlCol="0" anchor="ctr"/>
+          <a:lstStyle/>
+          <a:p>
+            <a:pPr algn="ctr"/>
+            <a:r>
+              <a:rPr lang="en-US" dirty="0" smtClean="0"/>
+              <a:t>4</a:t>
+            </a:r>
+            <a:endParaRPr lang="en-US" dirty="0"/>
+          </a:p>
+        </p:txBody>
+      </p:sp>
+      <p:cxnSp>
+        <p:nvCxnSpPr>
+          <p:cNvPr id="35" name="Straight Arrow Connector 34"/>
+          <p:cNvCxnSpPr/>
+          <p:nvPr/>
+        </p:nvCxnSpPr>
+        <p:spPr>
+          <a:xfrm>
+            <a:off x="7162800" y="3631745"/>
+            <a:ext cx="0" cy="454815"/>
+          </a:xfrm>
+          <a:prstGeom prst="straightConnector1">
+            <a:avLst/>
+          </a:prstGeom>
+          <a:ln w="25400">
+            <a:solidFill>
+              <a:schemeClr val="tx1"/>
+            </a:solidFill>
+            <a:tailEnd type="arrow"/>
+          </a:ln>
+        </p:spPr>
+        <p:style>
+          <a:lnRef idx="1">
+            <a:schemeClr val="accent1"/>
+          </a:lnRef>
+          <a:fillRef idx="0">
+            <a:schemeClr val="accent1"/>
+          </a:fillRef>
+          <a:effectRef idx="0">
+            <a:schemeClr val="accent1"/>
+          </a:effectRef>
+          <a:fontRef idx="minor">
+            <a:schemeClr val="tx1"/>
+          </a:fontRef>
+        </p:style>
+      </p:cxnSp>
+      <p:cxnSp>
+        <p:nvCxnSpPr>
+          <p:cNvPr id="38" name="Straight Arrow Connector 37"/>
+          <p:cNvCxnSpPr/>
+          <p:nvPr/>
+        </p:nvCxnSpPr>
+        <p:spPr>
+          <a:xfrm>
+            <a:off x="7177365" y="4769232"/>
+            <a:ext cx="0" cy="381000"/>
+          </a:xfrm>
+          <a:prstGeom prst="straightConnector1">
+            <a:avLst/>
+          </a:prstGeom>
+          <a:ln w="25400">
+            <a:solidFill>
+              <a:schemeClr val="tx1"/>
+            </a:solidFill>
+            <a:tailEnd type="arrow"/>
+          </a:ln>
+        </p:spPr>
+        <p:style>
+          <a:lnRef idx="1">
+            <a:schemeClr val="accent1"/>
+          </a:lnRef>
+          <a:fillRef idx="0">
+            <a:schemeClr val="accent1"/>
+          </a:fillRef>
+          <a:effectRef idx="0">
+            <a:schemeClr val="accent1"/>
+          </a:effectRef>
+          <a:fontRef idx="minor">
+            <a:schemeClr val="tx1"/>
+          </a:fontRef>
+        </p:style>
+      </p:cxnSp>
+      <p:sp>
+        <p:nvSpPr>
+          <p:cNvPr id="3" name="Right Brace 2"/>
+          <p:cNvSpPr/>
+          <p:nvPr/>
+        </p:nvSpPr>
+        <p:spPr>
+          <a:xfrm>
+            <a:off x="7772400" y="4226444"/>
+            <a:ext cx="304800" cy="1336156"/>
+          </a:xfrm>
+          <a:prstGeom prst="rightBrace">
+            <a:avLst/>
+          </a:prstGeom>
+          <a:ln>
+            <a:solidFill>
+              <a:schemeClr val="accent3">
+                <a:lumMod val="50000"/>
+              </a:schemeClr>
+            </a:solidFill>
+          </a:ln>
+        </p:spPr>
+        <p:style>
+          <a:lnRef idx="1">
+            <a:schemeClr val="accent1"/>
+          </a:lnRef>
+          <a:fillRef idx="0">
+            <a:schemeClr val="accent1"/>
+          </a:fillRef>
+          <a:effectRef idx="0">
+            <a:schemeClr val="accent1"/>
+          </a:effectRef>
+          <a:fontRef idx="minor">
+            <a:schemeClr val="tx1"/>
+          </a:fontRef>
+        </p:style>
+        <p:txBody>
+          <a:bodyPr rtlCol="0" anchor="ctr"/>
+          <a:lstStyle/>
+          <a:p>
+            <a:pPr algn="ctr"/>
+            <a:endParaRPr lang="en-US"/>
+          </a:p>
+        </p:txBody>
+      </p:sp>
+      <p:sp>
+        <p:nvSpPr>
+          <p:cNvPr id="31" name="TextBox 30"/>
+          <p:cNvSpPr txBox="1"/>
+          <p:nvPr/>
+        </p:nvSpPr>
+        <p:spPr>
+          <a:xfrm>
+            <a:off x="8230814" y="4725245"/>
+            <a:ext cx="617477" cy="338554"/>
+          </a:xfrm>
+          <a:prstGeom prst="rect">
+            <a:avLst/>
+          </a:prstGeom>
+          <a:noFill/>
+        </p:spPr>
+        <p:txBody>
+          <a:bodyPr wrap="none" rtlCol="0">
+            <a:spAutoFit/>
+          </a:bodyPr>
+          <a:lstStyle/>
+          <a:p>
+            <a:r>
+              <a:rPr lang="en-US" sz="1600" b="1" dirty="0" smtClean="0">
+                <a:solidFill>
+                  <a:schemeClr val="accent3">
+                    <a:lumMod val="50000"/>
+                  </a:schemeClr>
+                </a:solidFill>
+              </a:rPr>
+              <a:t>N = 2</a:t>
+            </a:r>
+            <a:endParaRPr lang="en-US" sz="1600" b="1" dirty="0">
+              <a:solidFill>
+                <a:schemeClr val="accent3">
+                  <a:lumMod val="50000"/>
+                </a:schemeClr>
+              </a:solidFill>
+            </a:endParaRPr>
+          </a:p>
+        </p:txBody>
+      </p:sp>
+      <p:sp>
+        <p:nvSpPr>
+          <p:cNvPr id="4" name="Oval 3"/>
+          <p:cNvSpPr/>
+          <p:nvPr/>
+        </p:nvSpPr>
+        <p:spPr>
+          <a:xfrm>
+            <a:off x="6400800" y="3631745"/>
+            <a:ext cx="2590800" cy="2616655"/>
+          </a:xfrm>
+          <a:prstGeom prst="ellipse">
+            <a:avLst/>
+          </a:prstGeom>
+          <a:noFill/>
+          <a:ln>
+            <a:solidFill>
+              <a:schemeClr val="tx1"/>
+            </a:solidFill>
+            <a:prstDash val="dash"/>
+          </a:ln>
+        </p:spPr>
+        <p:style>
+          <a:lnRef idx="2">
+            <a:schemeClr val="accent1">
+              <a:shade val="50000"/>
+            </a:schemeClr>
+          </a:lnRef>
+          <a:fillRef idx="1">
+            <a:schemeClr val="accent1"/>
+          </a:fillRef>
+          <a:effectRef idx="0">
+            <a:schemeClr val="accent1"/>
+          </a:effectRef>
+          <a:fontRef idx="minor">
+            <a:schemeClr val="lt1"/>
+          </a:fontRef>
+        </p:style>
+        <p:txBody>
+          <a:bodyPr rtlCol="0" anchor="ctr"/>
+          <a:lstStyle/>
+          <a:p>
+            <a:pPr algn="ctr"/>
+            <a:endParaRPr lang="en-US"/>
+          </a:p>
+        </p:txBody>
+      </p:sp>
+      <p:cxnSp>
+        <p:nvCxnSpPr>
+          <p:cNvPr id="36" name="Straight Arrow Connector 35"/>
+          <p:cNvCxnSpPr/>
+          <p:nvPr/>
+        </p:nvCxnSpPr>
+        <p:spPr>
+          <a:xfrm>
+            <a:off x="3665368" y="3646969"/>
+            <a:ext cx="289214" cy="439591"/>
+          </a:xfrm>
+          <a:prstGeom prst="straightConnector1">
+            <a:avLst/>
+          </a:prstGeom>
+          <a:ln w="25400">
+            <a:solidFill>
+              <a:schemeClr val="tx1"/>
+            </a:solidFill>
+            <a:tailEnd type="arrow"/>
+          </a:ln>
+        </p:spPr>
+        <p:style>
+          <a:lnRef idx="1">
+            <a:schemeClr val="accent1"/>
+          </a:lnRef>
+          <a:fillRef idx="0">
+            <a:schemeClr val="accent1"/>
+          </a:fillRef>
+          <a:effectRef idx="0">
+            <a:schemeClr val="accent1"/>
+          </a:effectRef>
+          <a:fontRef idx="minor">
+            <a:schemeClr val="tx1"/>
+          </a:fontRef>
+        </p:style>
+      </p:cxnSp>
+      <p:sp>
+        <p:nvSpPr>
+          <p:cNvPr id="39" name="Dodecagon 38"/>
+          <p:cNvSpPr/>
+          <p:nvPr/>
+        </p:nvSpPr>
+        <p:spPr>
+          <a:xfrm>
+            <a:off x="3643002" y="4070131"/>
+            <a:ext cx="838200" cy="762000"/>
+          </a:xfrm>
+          <a:prstGeom prst="dodecagon">
+            <a:avLst/>
+          </a:prstGeom>
+        </p:spPr>
+        <p:style>
+          <a:lnRef idx="2">
+            <a:schemeClr val="accent1">
+              <a:shade val="50000"/>
+            </a:schemeClr>
+          </a:lnRef>
+          <a:fillRef idx="1">
+            <a:schemeClr val="accent1"/>
+          </a:fillRef>
+          <a:effectRef idx="0">
+            <a:schemeClr val="accent1"/>
+          </a:effectRef>
+          <a:fontRef idx="minor">
+            <a:schemeClr val="lt1"/>
+          </a:fontRef>
+        </p:style>
+        <p:txBody>
+          <a:bodyPr rtlCol="0" anchor="ctr"/>
+          <a:lstStyle/>
+          <a:p>
+            <a:pPr algn="ctr"/>
+            <a:r>
+              <a:rPr lang="en-US" dirty="0" smtClean="0"/>
+              <a:t>4</a:t>
+            </a:r>
+            <a:endParaRPr lang="en-US" dirty="0"/>
+          </a:p>
+        </p:txBody>
+      </p:sp>
+      <p:cxnSp>
+        <p:nvCxnSpPr>
+          <p:cNvPr id="46" name="Straight Arrow Connector 45"/>
+          <p:cNvCxnSpPr>
+            <a:endCxn id="52" idx="11"/>
+          </p:cNvCxnSpPr>
+          <p:nvPr/>
+        </p:nvCxnSpPr>
+        <p:spPr>
+          <a:xfrm flipH="1">
+            <a:off x="3136345" y="3631745"/>
+            <a:ext cx="366621" cy="454815"/>
+          </a:xfrm>
+          <a:prstGeom prst="straightConnector1">
+            <a:avLst/>
+          </a:prstGeom>
+          <a:ln w="25400">
+            <a:solidFill>
+              <a:schemeClr val="tx1"/>
+            </a:solidFill>
+            <a:tailEnd type="arrow"/>
+          </a:ln>
+        </p:spPr>
+        <p:style>
+          <a:lnRef idx="1">
+            <a:schemeClr val="accent1"/>
+          </a:lnRef>
+          <a:fillRef idx="0">
+            <a:schemeClr val="accent1"/>
+          </a:fillRef>
+          <a:effectRef idx="0">
+            <a:schemeClr val="accent1"/>
+          </a:effectRef>
+          <a:fontRef idx="minor">
+            <a:schemeClr val="tx1"/>
+          </a:fontRef>
+        </p:style>
+      </p:cxnSp>
+      <p:sp>
+        <p:nvSpPr>
+          <p:cNvPr id="48" name="TextBox 47"/>
+          <p:cNvSpPr txBox="1"/>
+          <p:nvPr/>
+        </p:nvSpPr>
+        <p:spPr>
+          <a:xfrm>
+            <a:off x="457200" y="4086560"/>
+            <a:ext cx="1324530" cy="338554"/>
+          </a:xfrm>
+          <a:prstGeom prst="rect">
+            <a:avLst/>
+          </a:prstGeom>
+          <a:noFill/>
+        </p:spPr>
+        <p:txBody>
+          <a:bodyPr wrap="none" rtlCol="0">
+            <a:spAutoFit/>
+          </a:bodyPr>
+          <a:lstStyle/>
+          <a:p>
+            <a:r>
+              <a:rPr lang="en-US" sz="1600" dirty="0" smtClean="0"/>
+              <a:t>Solve for </a:t>
+            </a:r>
+            <a:r>
+              <a:rPr lang="en-US" sz="1600" dirty="0" smtClean="0"/>
+              <a:t>$.18</a:t>
+            </a:r>
+            <a:endParaRPr lang="en-US" sz="1600" dirty="0"/>
+          </a:p>
+        </p:txBody>
+      </p:sp>
+      <p:sp>
+        <p:nvSpPr>
+          <p:cNvPr id="51" name="TextBox 50"/>
+          <p:cNvSpPr txBox="1"/>
+          <p:nvPr/>
+        </p:nvSpPr>
+        <p:spPr>
+          <a:xfrm>
+            <a:off x="249657" y="6248400"/>
+            <a:ext cx="8435323" cy="584775"/>
+          </a:xfrm>
+          <a:prstGeom prst="rect">
+            <a:avLst/>
+          </a:prstGeom>
+          <a:noFill/>
+        </p:spPr>
+        <p:txBody>
+          <a:bodyPr wrap="none" rtlCol="0">
+            <a:spAutoFit/>
+          </a:bodyPr>
+          <a:lstStyle/>
+          <a:p>
+            <a:r>
+              <a:rPr lang="en-US" sz="1600" b="1" dirty="0" smtClean="0">
+                <a:solidFill>
+                  <a:schemeClr val="accent3">
+                    <a:lumMod val="50000"/>
+                  </a:schemeClr>
+                </a:solidFill>
+              </a:rPr>
+              <a:t>If sub-solution is N deep, then only search n-1 levels deeper for alternate solution. If not found at</a:t>
+            </a:r>
+          </a:p>
+          <a:p>
+            <a:r>
+              <a:rPr lang="en-US" sz="1600" b="1" dirty="0" smtClean="0">
+                <a:solidFill>
+                  <a:schemeClr val="accent3">
+                    <a:lumMod val="50000"/>
+                  </a:schemeClr>
+                </a:solidFill>
+              </a:rPr>
+              <a:t>N-1 depth, then alternate solution must be at least N deep and therefore not a better solution.</a:t>
+            </a:r>
+            <a:endParaRPr lang="en-US" sz="1600" b="1" dirty="0">
+              <a:solidFill>
+                <a:schemeClr val="accent3">
+                  <a:lumMod val="50000"/>
+                </a:schemeClr>
+              </a:solidFill>
+            </a:endParaRPr>
+          </a:p>
+        </p:txBody>
+      </p:sp>
+      <p:sp>
+        <p:nvSpPr>
+          <p:cNvPr id="52" name="Dodecagon 51"/>
+          <p:cNvSpPr/>
+          <p:nvPr/>
+        </p:nvSpPr>
+        <p:spPr>
+          <a:xfrm>
+            <a:off x="2604942" y="4086560"/>
+            <a:ext cx="838200" cy="762000"/>
+          </a:xfrm>
+          <a:prstGeom prst="dodecagon">
+            <a:avLst/>
+          </a:prstGeom>
+        </p:spPr>
+        <p:style>
+          <a:lnRef idx="2">
+            <a:schemeClr val="accent1">
+              <a:shade val="50000"/>
+            </a:schemeClr>
+          </a:lnRef>
+          <a:fillRef idx="1">
+            <a:schemeClr val="accent1"/>
+          </a:fillRef>
+          <a:effectRef idx="0">
+            <a:schemeClr val="accent1"/>
+          </a:effectRef>
+          <a:fontRef idx="minor">
+            <a:schemeClr val="lt1"/>
+          </a:fontRef>
+        </p:style>
+        <p:txBody>
+          <a:bodyPr rtlCol="0" anchor="ctr"/>
+          <a:lstStyle/>
+          <a:p>
+            <a:pPr algn="ctr"/>
+            <a:r>
+              <a:rPr lang="en-US" dirty="0" smtClean="0"/>
+              <a:t>1</a:t>
+            </a:r>
+            <a:endParaRPr lang="en-US" dirty="0"/>
+          </a:p>
+        </p:txBody>
+      </p:sp>
+      <p:sp>
+        <p:nvSpPr>
+          <p:cNvPr id="60" name="&quot;No&quot; Symbol 59"/>
+          <p:cNvSpPr/>
+          <p:nvPr/>
+        </p:nvSpPr>
+        <p:spPr>
+          <a:xfrm>
+            <a:off x="2826640" y="4940072"/>
+            <a:ext cx="380711" cy="345556"/>
+          </a:xfrm>
+          <a:prstGeom prst="noSmoking">
+            <a:avLst/>
+          </a:prstGeom>
+          <a:solidFill>
+            <a:srgbClr val="FF0000"/>
+          </a:solidFill>
+          <a:ln>
+            <a:solidFill>
+              <a:srgbClr val="FF0000"/>
+            </a:solidFill>
+          </a:ln>
+        </p:spPr>
+        <p:style>
+          <a:lnRef idx="2">
+            <a:schemeClr val="accent1">
+              <a:shade val="50000"/>
+            </a:schemeClr>
+          </a:lnRef>
+          <a:fillRef idx="1">
+            <a:schemeClr val="accent1"/>
+          </a:fillRef>
+          <a:effectRef idx="0">
+            <a:schemeClr val="accent1"/>
+          </a:effectRef>
+          <a:fontRef idx="minor">
+            <a:schemeClr val="lt1"/>
+          </a:fontRef>
+        </p:style>
+        <p:txBody>
+          <a:bodyPr rtlCol="0" anchor="ctr"/>
+          <a:lstStyle/>
+          <a:p>
+            <a:pPr algn="ctr"/>
+            <a:endParaRPr lang="en-US">
+              <a:solidFill>
+                <a:schemeClr val="tx1"/>
+              </a:solidFill>
+            </a:endParaRPr>
+          </a:p>
+        </p:txBody>
+      </p:sp>
+      <p:sp>
+        <p:nvSpPr>
+          <p:cNvPr id="61" name="&quot;No&quot; Symbol 60"/>
+          <p:cNvSpPr/>
+          <p:nvPr/>
+        </p:nvSpPr>
+        <p:spPr>
+          <a:xfrm>
+            <a:off x="3862825" y="4975913"/>
+            <a:ext cx="380711" cy="345556"/>
+          </a:xfrm>
+          <a:prstGeom prst="noSmoking">
+            <a:avLst/>
+          </a:prstGeom>
+          <a:solidFill>
+            <a:srgbClr val="FF0000"/>
+          </a:solidFill>
+          <a:ln>
+            <a:solidFill>
+              <a:srgbClr val="FF0000"/>
+            </a:solidFill>
+          </a:ln>
+        </p:spPr>
+        <p:style>
+          <a:lnRef idx="2">
+            <a:schemeClr val="accent1">
+              <a:shade val="50000"/>
+            </a:schemeClr>
+          </a:lnRef>
+          <a:fillRef idx="1">
+            <a:schemeClr val="accent1"/>
+          </a:fillRef>
+          <a:effectRef idx="0">
+            <a:schemeClr val="accent1"/>
+          </a:effectRef>
+          <a:fontRef idx="minor">
+            <a:schemeClr val="lt1"/>
+          </a:fontRef>
+        </p:style>
+        <p:txBody>
+          <a:bodyPr rtlCol="0" anchor="ctr"/>
+          <a:lstStyle/>
+          <a:p>
+            <a:pPr algn="ctr"/>
+            <a:endParaRPr lang="en-US">
+              <a:solidFill>
+                <a:schemeClr val="tx1"/>
+              </a:solidFill>
+            </a:endParaRPr>
+          </a:p>
+        </p:txBody>
+      </p:sp>
+      <p:sp>
+        <p:nvSpPr>
+          <p:cNvPr id="62" name="TextBox 61"/>
+          <p:cNvSpPr txBox="1"/>
+          <p:nvPr/>
+        </p:nvSpPr>
+        <p:spPr>
+          <a:xfrm>
+            <a:off x="544212" y="5002466"/>
+            <a:ext cx="1255152" cy="338554"/>
+          </a:xfrm>
+          <a:prstGeom prst="rect">
+            <a:avLst/>
+          </a:prstGeom>
+          <a:noFill/>
+        </p:spPr>
+        <p:txBody>
+          <a:bodyPr wrap="none" rtlCol="0">
+            <a:spAutoFit/>
+          </a:bodyPr>
+          <a:lstStyle/>
+          <a:p>
+            <a:r>
+              <a:rPr lang="en-US" sz="1600" b="1" dirty="0" smtClean="0">
+                <a:solidFill>
+                  <a:srgbClr val="FF0000"/>
+                </a:solidFill>
+              </a:rPr>
+              <a:t>Prune at N-1</a:t>
+            </a:r>
+            <a:endParaRPr lang="en-US" sz="1600" b="1" dirty="0">
+              <a:solidFill>
+                <a:srgbClr val="FF0000"/>
+              </a:solidFill>
+            </a:endParaRPr>
+          </a:p>
+        </p:txBody>
+      </p:sp>
+      <p:cxnSp>
+        <p:nvCxnSpPr>
+          <p:cNvPr id="66" name="Straight Arrow Connector 65"/>
+          <p:cNvCxnSpPr/>
+          <p:nvPr/>
+        </p:nvCxnSpPr>
+        <p:spPr>
+          <a:xfrm flipH="1">
+            <a:off x="3016996" y="4886138"/>
+            <a:ext cx="1" cy="600262"/>
+          </a:xfrm>
+          <a:prstGeom prst="straightConnector1">
+            <a:avLst/>
+          </a:prstGeom>
+          <a:ln w="25400">
+            <a:solidFill>
+              <a:schemeClr val="tx1"/>
+            </a:solidFill>
+            <a:tailEnd type="arrow"/>
+          </a:ln>
+        </p:spPr>
+        <p:style>
+          <a:lnRef idx="1">
+            <a:schemeClr val="accent1"/>
+          </a:lnRef>
+          <a:fillRef idx="0">
+            <a:schemeClr val="accent1"/>
+          </a:fillRef>
+          <a:effectRef idx="0">
+            <a:schemeClr val="accent1"/>
+          </a:effectRef>
+          <a:fontRef idx="minor">
+            <a:schemeClr val="tx1"/>
+          </a:fontRef>
+        </p:style>
+      </p:cxnSp>
+      <p:cxnSp>
+        <p:nvCxnSpPr>
+          <p:cNvPr id="68" name="Straight Arrow Connector 67"/>
+          <p:cNvCxnSpPr/>
+          <p:nvPr/>
+        </p:nvCxnSpPr>
+        <p:spPr>
+          <a:xfrm flipH="1">
+            <a:off x="4066885" y="4848560"/>
+            <a:ext cx="1" cy="600262"/>
+          </a:xfrm>
+          <a:prstGeom prst="straightConnector1">
+            <a:avLst/>
+          </a:prstGeom>
+          <a:ln w="25400">
+            <a:solidFill>
+              <a:schemeClr val="tx1"/>
+            </a:solidFill>
+            <a:tailEnd type="arrow"/>
+          </a:ln>
+        </p:spPr>
+        <p:style>
+          <a:lnRef idx="1">
+            <a:schemeClr val="accent1"/>
+          </a:lnRef>
+          <a:fillRef idx="0">
+            <a:schemeClr val="accent1"/>
+          </a:fillRef>
+          <a:effectRef idx="0">
+            <a:schemeClr val="accent1"/>
+          </a:effectRef>
+          <a:fontRef idx="minor">
+            <a:schemeClr val="tx1"/>
+          </a:fontRef>
+        </p:style>
+      </p:cxnSp>
+      <p:cxnSp>
+        <p:nvCxnSpPr>
+          <p:cNvPr id="71" name="Straight Arrow Connector 70"/>
+          <p:cNvCxnSpPr/>
+          <p:nvPr/>
+        </p:nvCxnSpPr>
+        <p:spPr>
+          <a:xfrm>
+            <a:off x="1781731" y="5195495"/>
+            <a:ext cx="961469" cy="0"/>
+          </a:xfrm>
+          <a:prstGeom prst="straightConnector1">
+            <a:avLst/>
+          </a:prstGeom>
+          <a:ln w="25400">
+            <a:solidFill>
+              <a:srgbClr val="FF0000"/>
+            </a:solidFill>
+            <a:tailEnd type="arrow"/>
+          </a:ln>
+        </p:spPr>
+        <p:style>
+          <a:lnRef idx="1">
+            <a:schemeClr val="accent1"/>
+          </a:lnRef>
+          <a:fillRef idx="0">
+            <a:schemeClr val="accent1"/>
+          </a:fillRef>
+          <a:effectRef idx="0">
+            <a:schemeClr val="accent1"/>
+          </a:effectRef>
+          <a:fontRef idx="minor">
+            <a:schemeClr val="tx1"/>
+          </a:fontRef>
+        </p:style>
+      </p:cxnSp>
+    </p:spTree>
+    <p:extLst>
+      <p:ext uri="{BB962C8B-B14F-4D97-AF65-F5344CB8AC3E}">
+        <p14:creationId xmlns:p14="http://schemas.microsoft.com/office/powerpoint/2010/main" val="66861506"/>
+      </p:ext>
+    </p:extLst>
+  </p:cSld>
+  <p:clrMapOvr>
+    <a:masterClrMapping/>
+  </p:clrMapOvr>
+  <p:timing>
+    <p:tnLst>
+      <p:par>
+        <p:cTn id="1" dur="indefinite" restart="never" nodeType="tmRoot"/>
+      </p:par>
+    </p:tnLst>
+  </p:timing>
+</p:sld>
+</file>
+
+<file path=ppt/slides/slide18.xml><?xml version="1.0" encoding="utf-8"?>
+<p:sld xmlns:a="http://schemas.openxmlformats.org/drawingml/2006/main" xmlns:r="http://schemas.openxmlformats.org/officeDocument/2006/relationships" xmlns:p="http://schemas.openxmlformats.org/presentationml/2006/main">
+  <p:cSld>
+    <p:spTree>
+      <p:nvGrpSpPr>
+        <p:cNvPr id="1" name=""/>
+        <p:cNvGrpSpPr/>
+        <p:nvPr/>
+      </p:nvGrpSpPr>
+      <p:grpSpPr>
+        <a:xfrm>
+          <a:off x="0" y="0"/>
+          <a:ext cx="0" cy="0"/>
+          <a:chOff x="0" y="0"/>
+          <a:chExt cx="0" cy="0"/>
+        </a:xfrm>
+      </p:grpSpPr>
+      <p:sp>
+        <p:nvSpPr>
+          <p:cNvPr id="2" name="Title 1"/>
+          <p:cNvSpPr>
+            <a:spLocks noGrp="1"/>
+          </p:cNvSpPr>
+          <p:nvPr>
+            <p:ph type="title"/>
+          </p:nvPr>
+        </p:nvSpPr>
+        <p:spPr>
+          <a:xfrm>
+            <a:off x="152400" y="274638"/>
+            <a:ext cx="8915399" cy="792162"/>
+          </a:xfrm>
+        </p:spPr>
+        <p:txBody>
+          <a:bodyPr>
+            <a:normAutofit/>
+          </a:bodyPr>
+          <a:lstStyle/>
+          <a:p>
+            <a:pPr algn="l"/>
+            <a:r>
+              <a:rPr lang="en-US" sz="4000" dirty="0" smtClean="0">
+                <a:solidFill>
+                  <a:schemeClr val="accent1">
+                    <a:lumMod val="75000"/>
+                  </a:schemeClr>
+                </a:solidFill>
+              </a:rPr>
               <a:t>Search Solution Space for Prior Solutions</a:t>
             </a:r>
             <a:endParaRPr lang="en-US" sz="4000" dirty="0">
@@ -13781,27 +15302,7 @@
                   </a:schemeClr>
                 </a:solidFill>
               </a:rPr>
-              <a:t>Solution can be pre-designed and code because </a:t>
-            </a:r>
-            <a:r>
-              <a:rPr lang="en-US" sz="2000" b="1" dirty="0" smtClean="0">
-                <a:solidFill>
-                  <a:schemeClr val="tx2">
-                    <a:lumMod val="75000"/>
-                  </a:schemeClr>
-                </a:solidFill>
-              </a:rPr>
-              <a:t>the coins  </a:t>
-            </a:r>
-            <a:r>
-              <a:rPr lang="en-US" sz="2000" b="1" dirty="0" smtClean="0">
-                <a:solidFill>
-                  <a:schemeClr val="tx2">
-                    <a:lumMod val="75000"/>
-                  </a:schemeClr>
-                </a:solidFill>
-              </a:rPr>
-              <a:t>are multiples of each other.</a:t>
+              <a:t>Solution can be pre-designed and code because the coins  are multiples of each other.</a:t>
             </a:r>
             <a:endParaRPr lang="en-US" sz="2000" b="1" dirty="0">
               <a:solidFill>

</xml_diff>